<commit_message>
ajouté mon nom à la présentation
</commit_message>
<xml_diff>
--- a/fren-302/La presse à scandale doit être condamnée.pptx
+++ b/fren-302/La presse à scandale doit être condamnée.pptx
@@ -107,6 +107,11 @@
       </a:defRPr>
     </a:lvl9pPr>
   </p:defaultTextStyle>
+  <p:extLst>
+    <p:ext uri="{EFAFB233-063F-42B5-8137-9DF3F51BA10A}">
+      <p15:sldGuideLst xmlns:p15="http://schemas.microsoft.com/office/powerpoint/2012/main"/>
+    </p:ext>
+  </p:extLst>
 </p:presentation>
 </file>
 
@@ -4156,6 +4161,68 @@
           </a:p>
         </p:txBody>
       </p:sp>
+      <p:sp>
+        <p:nvSpPr>
+          <p:cNvPr id="3" name="Title 1">
+            <a:extLst>
+              <a:ext uri="{FF2B5EF4-FFF2-40B4-BE49-F238E27FC236}">
+                <a16:creationId xmlns:a16="http://schemas.microsoft.com/office/drawing/2014/main" id="{1C63073C-696D-4332-B5D3-62962C58557A}"/>
+              </a:ext>
+            </a:extLst>
+          </p:cNvPr>
+          <p:cNvSpPr txBox="1">
+            <a:spLocks/>
+          </p:cNvSpPr>
+          <p:nvPr/>
+        </p:nvSpPr>
+        <p:spPr>
+          <a:xfrm>
+            <a:off x="942392" y="5756988"/>
+            <a:ext cx="10307216" cy="699985"/>
+          </a:xfrm>
+          <a:prstGeom prst="rect">
+            <a:avLst/>
+          </a:prstGeom>
+        </p:spPr>
+        <p:txBody>
+          <a:bodyPr vert="horz" lIns="91440" tIns="45720" rIns="91440" bIns="45720" rtlCol="0" anchor="b">
+            <a:normAutofit lnSpcReduction="10000"/>
+          </a:bodyPr>
+          <a:lstStyle>
+            <a:lvl1pPr algn="ctr" defTabSz="914400" rtl="0" eaLnBrk="1" latinLnBrk="0" hangingPunct="1">
+              <a:lnSpc>
+                <a:spcPct val="90000"/>
+              </a:lnSpc>
+              <a:spcBef>
+                <a:spcPct val="0"/>
+              </a:spcBef>
+              <a:buNone/>
+              <a:defRPr sz="6000" kern="1200">
+                <a:solidFill>
+                  <a:schemeClr val="tx1"/>
+                </a:solidFill>
+                <a:latin typeface="+mj-lt"/>
+                <a:ea typeface="+mj-ea"/>
+                <a:cs typeface="+mj-cs"/>
+              </a:defRPr>
+            </a:lvl1pPr>
+          </a:lstStyle>
+          <a:p>
+            <a:pPr algn="r"/>
+            <a:r>
+              <a:rPr lang="fr-FR" sz="4400" dirty="0">
+                <a:latin typeface="Angsana New" panose="02020603050405020304" pitchFamily="18" charset="-34"/>
+                <a:cs typeface="Angsana New" panose="02020603050405020304" pitchFamily="18" charset="-34"/>
+              </a:rPr>
+              <a:t>Ihor Parkhomenko</a:t>
+            </a:r>
+            <a:endParaRPr lang="en-US" sz="4400" dirty="0">
+              <a:latin typeface="Angsana New" panose="02020603050405020304" pitchFamily="18" charset="-34"/>
+              <a:cs typeface="Angsana New" panose="02020603050405020304" pitchFamily="18" charset="-34"/>
+            </a:endParaRPr>
+          </a:p>
+        </p:txBody>
+      </p:sp>
     </p:spTree>
     <p:extLst>
       <p:ext uri="{BB962C8B-B14F-4D97-AF65-F5344CB8AC3E}">

</xml_diff>